<commit_message>
DG updates Use PhotoStorage interface in Storage instead of the class
</commit_message>
<xml_diff>
--- a/docs/diagrams/ChangeProfilePhotoCommandUML.pptx
+++ b/docs/diagrams/ChangeProfilePhotoCommandUML.pptx
@@ -261,7 +261,7 @@
           <a:p>
             <a:fld id="{5F32F1BD-5ACE-4680-9DDB-00A935F3EA30}" type="datetimeFigureOut">
               <a:rPr lang="en-IN" smtClean="0"/>
-              <a:t>21-03-2018</a:t>
+              <a:t>15-04-2018</a:t>
             </a:fld>
             <a:endParaRPr lang="en-IN"/>
           </a:p>
@@ -461,7 +461,7 @@
           <a:p>
             <a:fld id="{5F32F1BD-5ACE-4680-9DDB-00A935F3EA30}" type="datetimeFigureOut">
               <a:rPr lang="en-IN" smtClean="0"/>
-              <a:t>21-03-2018</a:t>
+              <a:t>15-04-2018</a:t>
             </a:fld>
             <a:endParaRPr lang="en-IN"/>
           </a:p>
@@ -671,7 +671,7 @@
           <a:p>
             <a:fld id="{5F32F1BD-5ACE-4680-9DDB-00A935F3EA30}" type="datetimeFigureOut">
               <a:rPr lang="en-IN" smtClean="0"/>
-              <a:t>21-03-2018</a:t>
+              <a:t>15-04-2018</a:t>
             </a:fld>
             <a:endParaRPr lang="en-IN"/>
           </a:p>
@@ -871,7 +871,7 @@
           <a:p>
             <a:fld id="{5F32F1BD-5ACE-4680-9DDB-00A935F3EA30}" type="datetimeFigureOut">
               <a:rPr lang="en-IN" smtClean="0"/>
-              <a:t>21-03-2018</a:t>
+              <a:t>15-04-2018</a:t>
             </a:fld>
             <a:endParaRPr lang="en-IN"/>
           </a:p>
@@ -1147,7 +1147,7 @@
           <a:p>
             <a:fld id="{5F32F1BD-5ACE-4680-9DDB-00A935F3EA30}" type="datetimeFigureOut">
               <a:rPr lang="en-IN" smtClean="0"/>
-              <a:t>21-03-2018</a:t>
+              <a:t>15-04-2018</a:t>
             </a:fld>
             <a:endParaRPr lang="en-IN"/>
           </a:p>
@@ -1415,7 +1415,7 @@
           <a:p>
             <a:fld id="{5F32F1BD-5ACE-4680-9DDB-00A935F3EA30}" type="datetimeFigureOut">
               <a:rPr lang="en-IN" smtClean="0"/>
-              <a:t>21-03-2018</a:t>
+              <a:t>15-04-2018</a:t>
             </a:fld>
             <a:endParaRPr lang="en-IN"/>
           </a:p>
@@ -1830,7 +1830,7 @@
           <a:p>
             <a:fld id="{5F32F1BD-5ACE-4680-9DDB-00A935F3EA30}" type="datetimeFigureOut">
               <a:rPr lang="en-IN" smtClean="0"/>
-              <a:t>21-03-2018</a:t>
+              <a:t>15-04-2018</a:t>
             </a:fld>
             <a:endParaRPr lang="en-IN"/>
           </a:p>
@@ -1972,7 +1972,7 @@
           <a:p>
             <a:fld id="{5F32F1BD-5ACE-4680-9DDB-00A935F3EA30}" type="datetimeFigureOut">
               <a:rPr lang="en-IN" smtClean="0"/>
-              <a:t>21-03-2018</a:t>
+              <a:t>15-04-2018</a:t>
             </a:fld>
             <a:endParaRPr lang="en-IN"/>
           </a:p>
@@ -2085,7 +2085,7 @@
           <a:p>
             <a:fld id="{5F32F1BD-5ACE-4680-9DDB-00A935F3EA30}" type="datetimeFigureOut">
               <a:rPr lang="en-IN" smtClean="0"/>
-              <a:t>21-03-2018</a:t>
+              <a:t>15-04-2018</a:t>
             </a:fld>
             <a:endParaRPr lang="en-IN"/>
           </a:p>
@@ -2398,7 +2398,7 @@
           <a:p>
             <a:fld id="{5F32F1BD-5ACE-4680-9DDB-00A935F3EA30}" type="datetimeFigureOut">
               <a:rPr lang="en-IN" smtClean="0"/>
-              <a:t>21-03-2018</a:t>
+              <a:t>15-04-2018</a:t>
             </a:fld>
             <a:endParaRPr lang="en-IN"/>
           </a:p>
@@ -2687,7 +2687,7 @@
           <a:p>
             <a:fld id="{5F32F1BD-5ACE-4680-9DDB-00A935F3EA30}" type="datetimeFigureOut">
               <a:rPr lang="en-IN" smtClean="0"/>
-              <a:t>21-03-2018</a:t>
+              <a:t>15-04-2018</a:t>
             </a:fld>
             <a:endParaRPr lang="en-IN"/>
           </a:p>
@@ -2930,7 +2930,7 @@
           <a:p>
             <a:fld id="{5F32F1BD-5ACE-4680-9DDB-00A935F3EA30}" type="datetimeFigureOut">
               <a:rPr lang="en-IN" smtClean="0"/>
-              <a:t>21-03-2018</a:t>
+              <a:t>15-04-2018</a:t>
             </a:fld>
             <a:endParaRPr lang="en-IN"/>
           </a:p>
@@ -3361,8 +3361,8 @@
         </p:nvSpPr>
         <p:spPr>
           <a:xfrm>
-            <a:off x="4627882" y="2231166"/>
-            <a:ext cx="2962620" cy="346760"/>
+            <a:off x="4824626" y="2054707"/>
+            <a:ext cx="2568157" cy="346760"/>
           </a:xfrm>
           <a:prstGeom prst="rect">
             <a:avLst/>
@@ -3426,8 +3426,8 @@
         </p:nvCxnSpPr>
         <p:spPr>
           <a:xfrm flipV="1">
-            <a:off x="6109192" y="1850224"/>
-            <a:ext cx="3085" cy="380942"/>
+            <a:off x="6108705" y="1673765"/>
+            <a:ext cx="3573" cy="380942"/>
           </a:xfrm>
           <a:prstGeom prst="line">
             <a:avLst/>
@@ -3462,7 +3462,7 @@
         </p:nvSpPr>
         <p:spPr>
           <a:xfrm>
-            <a:off x="5969308" y="1687744"/>
+            <a:off x="5969308" y="1681328"/>
             <a:ext cx="284295" cy="156155"/>
           </a:xfrm>
           <a:prstGeom prst="triangle">
@@ -3573,7 +3573,7 @@
         </p:nvSpPr>
         <p:spPr>
           <a:xfrm>
-            <a:off x="4277359" y="3366325"/>
+            <a:off x="4277359" y="2949232"/>
             <a:ext cx="1166415" cy="346760"/>
           </a:xfrm>
           <a:prstGeom prst="rect">
@@ -3635,7 +3635,7 @@
         </p:nvSpPr>
         <p:spPr>
           <a:xfrm>
-            <a:off x="6762924" y="3350789"/>
+            <a:off x="6762924" y="2952948"/>
             <a:ext cx="1259718" cy="346760"/>
           </a:xfrm>
           <a:prstGeom prst="rect">
@@ -3701,33 +3701,28 @@
         </p:nvCxnSpPr>
         <p:spPr>
           <a:xfrm rot="5400000">
-            <a:off x="5185449" y="2455543"/>
-            <a:ext cx="585901" cy="1235663"/>
+            <a:off x="5302555" y="2155557"/>
+            <a:ext cx="351688" cy="1235663"/>
           </a:xfrm>
           <a:prstGeom prst="bentConnector3">
             <a:avLst>
               <a:gd name="adj1" fmla="val 50000"/>
             </a:avLst>
           </a:prstGeom>
-          <a:ln w="9525" cap="flat" cmpd="sng" algn="ctr">
-            <a:solidFill>
-              <a:schemeClr val="accent6"/>
-            </a:solidFill>
-            <a:prstDash val="solid"/>
-            <a:round/>
+          <a:ln>
             <a:headEnd type="none" w="med" len="med"/>
-            <a:tailEnd type="arrow" w="med" len="med"/>
+            <a:tailEnd type="none" w="med" len="med"/>
           </a:ln>
         </p:spPr>
         <p:style>
-          <a:lnRef idx="0">
-            <a:scrgbClr r="0" g="0" b="0"/>
+          <a:lnRef idx="1">
+            <a:schemeClr val="accent6"/>
           </a:lnRef>
           <a:fillRef idx="0">
-            <a:scrgbClr r="0" g="0" b="0"/>
+            <a:schemeClr val="accent6"/>
           </a:fillRef>
           <a:effectRef idx="0">
-            <a:scrgbClr r="0" g="0" b="0"/>
+            <a:schemeClr val="accent6"/>
           </a:effectRef>
           <a:fontRef idx="minor">
             <a:schemeClr val="tx1"/>
@@ -3748,7 +3743,7 @@
         </p:nvSpPr>
         <p:spPr>
           <a:xfrm>
-            <a:off x="4553488" y="3100509"/>
+            <a:off x="4553488" y="2689832"/>
             <a:ext cx="271139" cy="276999"/>
           </a:xfrm>
           <a:prstGeom prst="rect">
@@ -3787,7 +3782,7 @@
         </p:nvSpPr>
         <p:spPr>
           <a:xfrm>
-            <a:off x="5998297" y="2593462"/>
+            <a:off x="5998297" y="2410582"/>
             <a:ext cx="195865" cy="186962"/>
           </a:xfrm>
           <a:prstGeom prst="diamond">
@@ -3827,69 +3822,21 @@
           </a:p>
         </p:txBody>
       </p:sp>
-      <p:cxnSp>
-        <p:nvCxnSpPr>
-          <p:cNvPr id="152" name="Connector: Elbow 151">
-            <a:extLst>
-              <a:ext uri="{FF2B5EF4-FFF2-40B4-BE49-F238E27FC236}">
-                <a16:creationId xmlns:a16="http://schemas.microsoft.com/office/drawing/2014/main" id="{0D9EADF2-5C9F-40EA-B206-14AB10DCAA7B}"/>
-              </a:ext>
-            </a:extLst>
-          </p:cNvPr>
-          <p:cNvCxnSpPr>
-            <a:cxnSpLocks/>
-            <a:endCxn id="16" idx="0"/>
-          </p:cNvCxnSpPr>
+      <p:sp>
+        <p:nvSpPr>
+          <p:cNvPr id="154" name="TextBox 153">
+            <a:extLst>
+              <a:ext uri="{FF2B5EF4-FFF2-40B4-BE49-F238E27FC236}">
+                <a16:creationId xmlns:a16="http://schemas.microsoft.com/office/drawing/2014/main" id="{F5C09BED-ADE0-483E-B810-55A81F128C79}"/>
+              </a:ext>
+            </a:extLst>
+          </p:cNvPr>
+          <p:cNvSpPr txBox="1"/>
           <p:nvPr/>
-        </p:nvCxnSpPr>
+        </p:nvSpPr>
         <p:spPr>
           <a:xfrm>
-            <a:off x="5044850" y="3073792"/>
-            <a:ext cx="2347933" cy="276997"/>
-          </a:xfrm>
-          <a:prstGeom prst="bentConnector2">
-            <a:avLst/>
-          </a:prstGeom>
-          <a:ln w="9525" cap="flat" cmpd="sng" algn="ctr">
-            <a:solidFill>
-              <a:schemeClr val="accent6"/>
-            </a:solidFill>
-            <a:prstDash val="solid"/>
-            <a:round/>
-            <a:headEnd type="none" w="med" len="med"/>
-            <a:tailEnd type="arrow" w="med" len="med"/>
-          </a:ln>
-        </p:spPr>
-        <p:style>
-          <a:lnRef idx="0">
-            <a:scrgbClr r="0" g="0" b="0"/>
-          </a:lnRef>
-          <a:fillRef idx="0">
-            <a:scrgbClr r="0" g="0" b="0"/>
-          </a:fillRef>
-          <a:effectRef idx="0">
-            <a:scrgbClr r="0" g="0" b="0"/>
-          </a:effectRef>
-          <a:fontRef idx="minor">
-            <a:schemeClr val="tx1"/>
-          </a:fontRef>
-        </p:style>
-      </p:cxnSp>
-      <p:sp>
-        <p:nvSpPr>
-          <p:cNvPr id="154" name="TextBox 153">
-            <a:extLst>
-              <a:ext uri="{FF2B5EF4-FFF2-40B4-BE49-F238E27FC236}">
-                <a16:creationId xmlns:a16="http://schemas.microsoft.com/office/drawing/2014/main" id="{F5C09BED-ADE0-483E-B810-55A81F128C79}"/>
-              </a:ext>
-            </a:extLst>
-          </p:cNvPr>
-          <p:cNvSpPr txBox="1"/>
-          <p:nvPr/>
-        </p:nvSpPr>
-        <p:spPr>
-          <a:xfrm>
-            <a:off x="7366117" y="3100509"/>
+            <a:off x="7366117" y="2728336"/>
             <a:ext cx="271139" cy="276999"/>
           </a:xfrm>
           <a:prstGeom prst="rect">
@@ -3914,6 +3861,52 @@
           </a:p>
         </p:txBody>
       </p:sp>
+      <p:cxnSp>
+        <p:nvCxnSpPr>
+          <p:cNvPr id="3" name="Connector: Elbow 2">
+            <a:extLst>
+              <a:ext uri="{FF2B5EF4-FFF2-40B4-BE49-F238E27FC236}">
+                <a16:creationId xmlns:a16="http://schemas.microsoft.com/office/drawing/2014/main" id="{6EBD3A79-1973-49A5-A9C9-579FDF947DA4}"/>
+              </a:ext>
+            </a:extLst>
+          </p:cNvPr>
+          <p:cNvCxnSpPr>
+            <a:cxnSpLocks/>
+            <a:stCxn id="76" idx="2"/>
+            <a:endCxn id="16" idx="0"/>
+          </p:cNvCxnSpPr>
+          <p:nvPr/>
+        </p:nvCxnSpPr>
+        <p:spPr>
+          <a:xfrm rot="16200000" flipH="1">
+            <a:off x="6566804" y="2126969"/>
+            <a:ext cx="355404" cy="1296553"/>
+          </a:xfrm>
+          <a:prstGeom prst="bentConnector3">
+            <a:avLst>
+              <a:gd name="adj1" fmla="val 50000"/>
+            </a:avLst>
+          </a:prstGeom>
+          <a:ln>
+            <a:headEnd type="none" w="med" len="med"/>
+            <a:tailEnd type="none" w="med" len="med"/>
+          </a:ln>
+        </p:spPr>
+        <p:style>
+          <a:lnRef idx="1">
+            <a:schemeClr val="accent6"/>
+          </a:lnRef>
+          <a:fillRef idx="0">
+            <a:schemeClr val="accent6"/>
+          </a:fillRef>
+          <a:effectRef idx="0">
+            <a:schemeClr val="accent6"/>
+          </a:effectRef>
+          <a:fontRef idx="minor">
+            <a:schemeClr val="tx1"/>
+          </a:fontRef>
+        </p:style>
+      </p:cxnSp>
     </p:spTree>
     <p:extLst>
       <p:ext uri="{BB962C8B-B14F-4D97-AF65-F5344CB8AC3E}">

</xml_diff>